<commit_message>
Manual - first draft
</commit_message>
<xml_diff>
--- a/Manual/MM_EA_Document_Generation_System_GENIVI_AMM_GOT_2014.pptx
+++ b/Manual/MM_EA_Document_Generation_System_GENIVI_AMM_GOT_2014.pptx
@@ -289,7 +289,7 @@
               <a:pPr>
                 <a:defRPr/>
               </a:pPr>
-              <a:t>5/22/2014</a:t>
+              <a:t>7/22/2014</a:t>
             </a:fld>
             <a:endParaRPr lang="en-US" dirty="0"/>
           </a:p>
@@ -952,7 +952,7 @@
               <a:pPr>
                 <a:defRPr/>
               </a:pPr>
-              <a:t>5/22/2014</a:t>
+              <a:t>7/22/2014</a:t>
             </a:fld>
             <a:endParaRPr lang="en-US" dirty="0"/>
           </a:p>
@@ -1170,7 +1170,7 @@
               <a:pPr>
                 <a:defRPr/>
               </a:pPr>
-              <a:t>5/22/2014</a:t>
+              <a:t>7/22/2014</a:t>
             </a:fld>
             <a:endParaRPr lang="en-US" dirty="0"/>
           </a:p>
@@ -1461,7 +1461,7 @@
               <a:pPr>
                 <a:defRPr/>
               </a:pPr>
-              <a:t>5/22/2014</a:t>
+              <a:t>7/22/2014</a:t>
             </a:fld>
             <a:endParaRPr lang="en-US" dirty="0"/>
           </a:p>
@@ -1797,7 +1797,7 @@
               <a:pPr>
                 <a:defRPr/>
               </a:pPr>
-              <a:t>5/22/2014</a:t>
+              <a:t>7/22/2014</a:t>
             </a:fld>
             <a:endParaRPr lang="en-US" dirty="0"/>
           </a:p>
@@ -2263,7 +2263,7 @@
               <a:pPr>
                 <a:defRPr/>
               </a:pPr>
-              <a:t>5/22/2014</a:t>
+              <a:t>7/22/2014</a:t>
             </a:fld>
             <a:endParaRPr lang="en-US" dirty="0"/>
           </a:p>
@@ -2429,7 +2429,7 @@
               <a:pPr>
                 <a:defRPr/>
               </a:pPr>
-              <a:t>5/22/2014</a:t>
+              <a:t>7/22/2014</a:t>
             </a:fld>
             <a:endParaRPr lang="en-US" dirty="0"/>
           </a:p>
@@ -2665,7 +2665,7 @@
               <a:pPr>
                 <a:defRPr/>
               </a:pPr>
-              <a:t>5/22/2014</a:t>
+              <a:t>7/22/2014</a:t>
             </a:fld>
             <a:endParaRPr lang="en-US" dirty="0"/>
           </a:p>
@@ -3342,7 +3342,7 @@
                   <a:spcPct val="0"/>
                 </a:spcAft>
               </a:pPr>
-              <a:t>22-May-14</a:t>
+              <a:t>22-Jul-14</a:t>
             </a:fld>
             <a:endParaRPr lang="en-US" smtClean="0">
               <a:solidFill>
@@ -3677,7 +3677,7 @@
         <p:spPr bwMode="auto">
           <a:xfrm>
             <a:off x="2990850" y="3571875"/>
-            <a:ext cx="4339714" cy="923330"/>
+            <a:ext cx="3608745" cy="923330"/>
           </a:xfrm>
           <a:prstGeom prst="rect">
             <a:avLst/>
@@ -3849,22 +3849,22 @@
               <a:t>Senior </a:t>
             </a:r>
             <a:r>
-              <a:rPr lang="en-US" sz="1800" dirty="0" err="1" smtClean="0">
-                <a:solidFill>
-                  <a:schemeClr val="bg1"/>
-                </a:solidFill>
-                <a:ea typeface="+mn-ea"/>
-              </a:rPr>
-              <a:t>Senior</a:t>
-            </a:r>
-            <a:r>
               <a:rPr lang="en-US" sz="1800" dirty="0" smtClean="0">
                 <a:solidFill>
                   <a:schemeClr val="bg1"/>
                 </a:solidFill>
                 <a:ea typeface="+mn-ea"/>
               </a:rPr>
-              <a:t> System/Software Architect</a:t>
+              <a:t>System/Software </a:t>
+            </a:r>
+            <a:r>
+              <a:rPr lang="en-US" sz="1800" dirty="0" smtClean="0">
+                <a:solidFill>
+                  <a:schemeClr val="bg1"/>
+                </a:solidFill>
+                <a:ea typeface="+mn-ea"/>
+              </a:rPr>
+              <a:t>Architect</a:t>
             </a:r>
             <a:endParaRPr lang="en-US" sz="1800" dirty="0">
               <a:solidFill>
@@ -4053,7 +4053,7 @@
               <a:pPr>
                 <a:defRPr/>
               </a:pPr>
-              <a:t>5/22/2014</a:t>
+              <a:t>7/22/2014</a:t>
             </a:fld>
             <a:endParaRPr lang="en-US" dirty="0"/>
           </a:p>
@@ -4605,7 +4605,7 @@
               <a:pPr>
                 <a:defRPr/>
               </a:pPr>
-              <a:t>5/22/2014</a:t>
+              <a:t>7/22/2014</a:t>
             </a:fld>
             <a:endParaRPr lang="en-US" dirty="0"/>
           </a:p>
@@ -5105,7 +5105,7 @@
               <a:pPr>
                 <a:defRPr/>
               </a:pPr>
-              <a:t>5/22/2014</a:t>
+              <a:t>7/22/2014</a:t>
             </a:fld>
             <a:endParaRPr lang="en-US" dirty="0"/>
           </a:p>
@@ -5282,7 +5282,7 @@
               <a:pPr>
                 <a:defRPr/>
               </a:pPr>
-              <a:t>5/22/2014</a:t>
+              <a:t>7/22/2014</a:t>
             </a:fld>
             <a:endParaRPr lang="en-US" dirty="0"/>
           </a:p>
@@ -6027,7 +6027,7 @@
               <a:pPr>
                 <a:defRPr/>
               </a:pPr>
-              <a:t>5/22/2014</a:t>
+              <a:t>7/22/2014</a:t>
             </a:fld>
             <a:endParaRPr lang="en-US" dirty="0"/>
           </a:p>
@@ -6696,7 +6696,7 @@
               <a:pPr>
                 <a:defRPr/>
               </a:pPr>
-              <a:t>5/22/2014</a:t>
+              <a:t>7/22/2014</a:t>
             </a:fld>
             <a:endParaRPr lang="en-US" dirty="0"/>
           </a:p>
@@ -7286,7 +7286,7 @@
               <a:pPr>
                 <a:defRPr/>
               </a:pPr>
-              <a:t>5/22/2014</a:t>
+              <a:t>7/22/2014</a:t>
             </a:fld>
             <a:endParaRPr lang="en-US" dirty="0"/>
           </a:p>
@@ -7741,7 +7741,7 @@
               <a:pPr>
                 <a:defRPr/>
               </a:pPr>
-              <a:t>5/22/2014</a:t>
+              <a:t>7/22/2014</a:t>
             </a:fld>
             <a:endParaRPr lang="en-US" dirty="0"/>
           </a:p>
@@ -8175,7 +8175,7 @@
               <a:pPr>
                 <a:defRPr/>
               </a:pPr>
-              <a:t>5/22/2014</a:t>
+              <a:t>7/22/2014</a:t>
             </a:fld>
             <a:endParaRPr lang="en-US" dirty="0"/>
           </a:p>
@@ -8706,7 +8706,7 @@
               <a:pPr>
                 <a:defRPr/>
               </a:pPr>
-              <a:t>5/22/2014</a:t>
+              <a:t>7/22/2014</a:t>
             </a:fld>
             <a:endParaRPr lang="en-US" dirty="0"/>
           </a:p>
@@ -9091,7 +9091,7 @@
                   <a:spcPct val="0"/>
                 </a:spcAft>
               </a:pPr>
-              <a:t>22-May-14</a:t>
+              <a:t>22-Jul-14</a:t>
             </a:fld>
             <a:endParaRPr lang="en-US" smtClean="0">
               <a:latin typeface="Arial" pitchFamily="-109" charset="0"/>
@@ -9476,7 +9476,7 @@
               <a:pPr>
                 <a:defRPr/>
               </a:pPr>
-              <a:t>5/22/2014</a:t>
+              <a:t>7/22/2014</a:t>
             </a:fld>
             <a:endParaRPr lang="en-US" dirty="0"/>
           </a:p>
@@ -9870,7 +9870,7 @@
               <a:pPr>
                 <a:defRPr/>
               </a:pPr>
-              <a:t>5/22/2014</a:t>
+              <a:t>7/22/2014</a:t>
             </a:fld>
             <a:endParaRPr lang="en-US" dirty="0"/>
           </a:p>
@@ -10864,7 +10864,7 @@
               <a:pPr>
                 <a:defRPr/>
               </a:pPr>
-              <a:t>5/22/2014</a:t>
+              <a:t>7/22/2014</a:t>
             </a:fld>
             <a:endParaRPr lang="en-US" dirty="0"/>
           </a:p>
@@ -11573,7 +11573,7 @@
               <a:pPr>
                 <a:defRPr/>
               </a:pPr>
-              <a:t>5/22/2014</a:t>
+              <a:t>7/22/2014</a:t>
             </a:fld>
             <a:endParaRPr lang="en-US" dirty="0"/>
           </a:p>
@@ -12396,7 +12396,7 @@
               <a:pPr>
                 <a:defRPr/>
               </a:pPr>
-              <a:t>5/22/2014</a:t>
+              <a:t>7/22/2014</a:t>
             </a:fld>
             <a:endParaRPr lang="en-US" dirty="0"/>
           </a:p>
@@ -13058,7 +13058,7 @@
               <a:pPr>
                 <a:defRPr/>
               </a:pPr>
-              <a:t>5/22/2014</a:t>
+              <a:t>7/22/2014</a:t>
             </a:fld>
             <a:endParaRPr lang="en-US" dirty="0"/>
           </a:p>
@@ -13712,7 +13712,7 @@
               <a:pPr>
                 <a:defRPr/>
               </a:pPr>
-              <a:t>5/22/2014</a:t>
+              <a:t>7/22/2014</a:t>
             </a:fld>
             <a:endParaRPr lang="en-US" dirty="0"/>
           </a:p>
@@ -14185,7 +14185,7 @@
               <a:pPr>
                 <a:defRPr/>
               </a:pPr>
-              <a:t>5/22/2014</a:t>
+              <a:t>7/22/2014</a:t>
             </a:fld>
             <a:endParaRPr lang="en-US" dirty="0"/>
           </a:p>
@@ -14680,7 +14680,7 @@
               <a:pPr>
                 <a:defRPr/>
               </a:pPr>
-              <a:t>5/22/2014</a:t>
+              <a:t>7/22/2014</a:t>
             </a:fld>
             <a:endParaRPr lang="en-US" dirty="0"/>
           </a:p>
@@ -14990,7 +14990,7 @@
               <a:pPr>
                 <a:defRPr/>
               </a:pPr>
-              <a:t>5/22/2014</a:t>
+              <a:t>7/22/2014</a:t>
             </a:fld>
             <a:endParaRPr lang="en-US" dirty="0"/>
           </a:p>
@@ -15195,7 +15195,7 @@
               <a:pPr>
                 <a:defRPr/>
               </a:pPr>
-              <a:t>5/22/2014</a:t>
+              <a:t>7/22/2014</a:t>
             </a:fld>
             <a:endParaRPr lang="en-US" dirty="0"/>
           </a:p>
@@ -15653,7 +15653,7 @@
               <a:pPr>
                 <a:defRPr/>
               </a:pPr>
-              <a:t>5/22/2014</a:t>
+              <a:t>7/22/2014</a:t>
             </a:fld>
             <a:endParaRPr lang="en-US" dirty="0"/>
           </a:p>
@@ -16269,7 +16269,7 @@
               <a:pPr>
                 <a:defRPr/>
               </a:pPr>
-              <a:t>5/22/2014</a:t>
+              <a:t>7/22/2014</a:t>
             </a:fld>
             <a:endParaRPr lang="en-US" dirty="0"/>
           </a:p>
@@ -16766,7 +16766,7 @@
               <a:pPr>
                 <a:defRPr/>
               </a:pPr>
-              <a:t>5/22/2014</a:t>
+              <a:t>7/22/2014</a:t>
             </a:fld>
             <a:endParaRPr lang="en-US" dirty="0"/>
           </a:p>
@@ -17350,7 +17350,7 @@
               <a:pPr>
                 <a:defRPr/>
               </a:pPr>
-              <a:t>5/22/2014</a:t>
+              <a:t>7/22/2014</a:t>
             </a:fld>
             <a:endParaRPr lang="en-US" dirty="0"/>
           </a:p>
@@ -17892,7 +17892,7 @@
               <a:pPr>
                 <a:defRPr/>
               </a:pPr>
-              <a:t>5/22/2014</a:t>
+              <a:t>7/22/2014</a:t>
             </a:fld>
             <a:endParaRPr lang="en-US" dirty="0"/>
           </a:p>
@@ -18153,7 +18153,6 @@
               <a:rPr lang="en-US" sz="2000" dirty="0"/>
               <a:t>();</a:t>
             </a:r>
-            <a:endParaRPr lang="en-US" sz="2000" dirty="0"/>
           </a:p>
         </p:txBody>
       </p:sp>
@@ -18207,7 +18206,7 @@
               <a:pPr>
                 <a:defRPr/>
               </a:pPr>
-              <a:t>5/22/2014</a:t>
+              <a:t>7/22/2014</a:t>
             </a:fld>
             <a:endParaRPr lang="en-US" dirty="0"/>
           </a:p>
@@ -18492,7 +18491,7 @@
               <a:pPr>
                 <a:defRPr/>
               </a:pPr>
-              <a:t>5/22/2014</a:t>
+              <a:t>7/22/2014</a:t>
             </a:fld>
             <a:endParaRPr lang="en-US" dirty="0"/>
           </a:p>
@@ -19195,7 +19194,7 @@
               <a:pPr>
                 <a:defRPr/>
               </a:pPr>
-              <a:t>5/22/2014</a:t>
+              <a:t>7/22/2014</a:t>
             </a:fld>
             <a:endParaRPr lang="en-US" dirty="0"/>
           </a:p>
@@ -19778,7 +19777,7 @@
               <a:pPr>
                 <a:defRPr/>
               </a:pPr>
-              <a:t>5/22/2014</a:t>
+              <a:t>7/22/2014</a:t>
             </a:fld>
             <a:endParaRPr lang="en-US" dirty="0"/>
           </a:p>
@@ -19947,7 +19946,7 @@
               <a:pPr>
                 <a:defRPr/>
               </a:pPr>
-              <a:t>5/22/2014</a:t>
+              <a:t>7/22/2014</a:t>
             </a:fld>
             <a:endParaRPr lang="en-US" dirty="0"/>
           </a:p>
@@ -20356,7 +20355,7 @@
               <a:pPr>
                 <a:defRPr/>
               </a:pPr>
-              <a:t>5/22/2014</a:t>
+              <a:t>7/22/2014</a:t>
             </a:fld>
             <a:endParaRPr lang="en-US" dirty="0"/>
           </a:p>
@@ -20875,7 +20874,7 @@
               <a:pPr>
                 <a:defRPr/>
               </a:pPr>
-              <a:t>5/22/2014</a:t>
+              <a:t>7/22/2014</a:t>
             </a:fld>
             <a:endParaRPr lang="en-US" dirty="0"/>
           </a:p>
@@ -21244,7 +21243,7 @@
               <a:pPr>
                 <a:defRPr/>
               </a:pPr>
-              <a:t>5/22/2014</a:t>
+              <a:t>7/22/2014</a:t>
             </a:fld>
             <a:endParaRPr lang="en-US" dirty="0"/>
           </a:p>
@@ -21730,7 +21729,7 @@
               <a:pPr>
                 <a:defRPr/>
               </a:pPr>
-              <a:t>5/22/2014</a:t>
+              <a:t>7/22/2014</a:t>
             </a:fld>
             <a:endParaRPr lang="en-US" dirty="0"/>
           </a:p>
@@ -22427,7 +22426,7 @@
               <a:pPr>
                 <a:defRPr/>
               </a:pPr>
-              <a:t>5/22/2014</a:t>
+              <a:t>7/22/2014</a:t>
             </a:fld>
             <a:endParaRPr lang="en-US" dirty="0"/>
           </a:p>
@@ -23055,7 +23054,7 @@
               <a:pPr>
                 <a:defRPr/>
               </a:pPr>
-              <a:t>5/22/2014</a:t>
+              <a:t>7/22/2014</a:t>
             </a:fld>
             <a:endParaRPr lang="en-US" dirty="0"/>
           </a:p>

</xml_diff>